<commit_message>
Update sentences and diagram powerpoints for undo redo command
</commit_message>
<xml_diff>
--- a/docs/diagrams/UndoRedoActivityDiagram.pptx
+++ b/docs/diagrams/UndoRedoActivityDiagram.pptx
@@ -112,10 +112,6 @@
 </p:presentation>
 </file>
 
-<file path=ppt/revisionInfo.xml><?xml version="1.0" encoding="utf-8"?>
-<p1510:revInfo xmlns:a="http://schemas.openxmlformats.org/drawingml/2006/main" xmlns:r="http://schemas.openxmlformats.org/officeDocument/2006/relationships" xmlns:p1510="http://schemas.microsoft.com/office/powerpoint/2015/10/main"/>
-</file>
-
 <file path=ppt/slideLayouts/slideLayout1.xml><?xml version="1.0" encoding="utf-8"?>
 <p:sldLayout xmlns:a="http://schemas.openxmlformats.org/drawingml/2006/main" xmlns:r="http://schemas.openxmlformats.org/officeDocument/2006/relationships" xmlns:p="http://schemas.openxmlformats.org/presentationml/2006/main" type="title" preserve="1">
   <p:cSld name="Title Slide">
@@ -265,7 +261,7 @@
           <a:p>
             <a:fld id="{542F47FF-5056-41FF-A1F8-23A414798AA4}" type="datetimeFigureOut">
               <a:rPr lang="en-SG" smtClean="0"/>
-              <a:t>6/7/2018</a:t>
+              <a:t>11/11/18</a:t>
             </a:fld>
             <a:endParaRPr lang="en-SG"/>
           </a:p>
@@ -465,7 +461,7 @@
           <a:p>
             <a:fld id="{542F47FF-5056-41FF-A1F8-23A414798AA4}" type="datetimeFigureOut">
               <a:rPr lang="en-SG" smtClean="0"/>
-              <a:t>6/7/2018</a:t>
+              <a:t>11/11/18</a:t>
             </a:fld>
             <a:endParaRPr lang="en-SG"/>
           </a:p>
@@ -675,7 +671,7 @@
           <a:p>
             <a:fld id="{542F47FF-5056-41FF-A1F8-23A414798AA4}" type="datetimeFigureOut">
               <a:rPr lang="en-SG" smtClean="0"/>
-              <a:t>6/7/2018</a:t>
+              <a:t>11/11/18</a:t>
             </a:fld>
             <a:endParaRPr lang="en-SG"/>
           </a:p>
@@ -875,7 +871,7 @@
           <a:p>
             <a:fld id="{542F47FF-5056-41FF-A1F8-23A414798AA4}" type="datetimeFigureOut">
               <a:rPr lang="en-SG" smtClean="0"/>
-              <a:t>6/7/2018</a:t>
+              <a:t>11/11/18</a:t>
             </a:fld>
             <a:endParaRPr lang="en-SG"/>
           </a:p>
@@ -1151,7 +1147,7 @@
           <a:p>
             <a:fld id="{542F47FF-5056-41FF-A1F8-23A414798AA4}" type="datetimeFigureOut">
               <a:rPr lang="en-SG" smtClean="0"/>
-              <a:t>6/7/2018</a:t>
+              <a:t>11/11/18</a:t>
             </a:fld>
             <a:endParaRPr lang="en-SG"/>
           </a:p>
@@ -1419,7 +1415,7 @@
           <a:p>
             <a:fld id="{542F47FF-5056-41FF-A1F8-23A414798AA4}" type="datetimeFigureOut">
               <a:rPr lang="en-SG" smtClean="0"/>
-              <a:t>6/7/2018</a:t>
+              <a:t>11/11/18</a:t>
             </a:fld>
             <a:endParaRPr lang="en-SG"/>
           </a:p>
@@ -1834,7 +1830,7 @@
           <a:p>
             <a:fld id="{542F47FF-5056-41FF-A1F8-23A414798AA4}" type="datetimeFigureOut">
               <a:rPr lang="en-SG" smtClean="0"/>
-              <a:t>6/7/2018</a:t>
+              <a:t>11/11/18</a:t>
             </a:fld>
             <a:endParaRPr lang="en-SG"/>
           </a:p>
@@ -1976,7 +1972,7 @@
           <a:p>
             <a:fld id="{542F47FF-5056-41FF-A1F8-23A414798AA4}" type="datetimeFigureOut">
               <a:rPr lang="en-SG" smtClean="0"/>
-              <a:t>6/7/2018</a:t>
+              <a:t>11/11/18</a:t>
             </a:fld>
             <a:endParaRPr lang="en-SG"/>
           </a:p>
@@ -2089,7 +2085,7 @@
           <a:p>
             <a:fld id="{542F47FF-5056-41FF-A1F8-23A414798AA4}" type="datetimeFigureOut">
               <a:rPr lang="en-SG" smtClean="0"/>
-              <a:t>6/7/2018</a:t>
+              <a:t>11/11/18</a:t>
             </a:fld>
             <a:endParaRPr lang="en-SG"/>
           </a:p>
@@ -2402,7 +2398,7 @@
           <a:p>
             <a:fld id="{542F47FF-5056-41FF-A1F8-23A414798AA4}" type="datetimeFigureOut">
               <a:rPr lang="en-SG" smtClean="0"/>
-              <a:t>6/7/2018</a:t>
+              <a:t>11/11/18</a:t>
             </a:fld>
             <a:endParaRPr lang="en-SG"/>
           </a:p>
@@ -2691,7 +2687,7 @@
           <a:p>
             <a:fld id="{542F47FF-5056-41FF-A1F8-23A414798AA4}" type="datetimeFigureOut">
               <a:rPr lang="en-SG" smtClean="0"/>
-              <a:t>6/7/2018</a:t>
+              <a:t>11/11/18</a:t>
             </a:fld>
             <a:endParaRPr lang="en-SG"/>
           </a:p>
@@ -2934,7 +2930,7 @@
           <a:p>
             <a:fld id="{542F47FF-5056-41FF-A1F8-23A414798AA4}" type="datetimeFigureOut">
               <a:rPr lang="en-SG" smtClean="0"/>
-              <a:t>6/7/2018</a:t>
+              <a:t>11/11/18</a:t>
             </a:fld>
             <a:endParaRPr lang="en-SG"/>
           </a:p>
@@ -3656,7 +3652,7 @@
             </a:r>
             <a:r>
               <a:rPr lang="en-US" dirty="0"/>
-              <a:t>command commits address book]</a:t>
+              <a:t>command commits module planner]</a:t>
             </a:r>
             <a:endParaRPr lang="en-SG" sz="1801" dirty="0"/>
           </a:p>
@@ -3709,16 +3705,13 @@
             <a:pPr algn="ctr"/>
             <a:r>
               <a:rPr lang="en-SG" sz="1801" dirty="0"/>
-              <a:t>Purge redundant states and then save address book to </a:t>
+              <a:t>Purge redundant states and then save module planner to </a:t>
             </a:r>
             <a:r>
               <a:rPr lang="en-SG" sz="1801" dirty="0" err="1"/>
-              <a:t>addressBookStateList</a:t>
-            </a:r>
-            <a:r>
-              <a:rPr lang="en-SG" sz="1801" dirty="0"/>
-              <a:t> </a:t>
-            </a:r>
+              <a:t>modulePlannerStateList</a:t>
+            </a:r>
+            <a:endParaRPr lang="en-SG" sz="1801" dirty="0"/>
           </a:p>
         </p:txBody>
       </p:sp>

</xml_diff>